<commit_message>
horizon is still a bit weird
</commit_message>
<xml_diff>
--- a/assets/textures/sky/sky_gradient.pptx
+++ b/assets/textures/sky/sky_gradient.pptx
@@ -8,6 +8,7 @@
     <p:sldId id="257" r:id="rId2"/>
     <p:sldId id="256" r:id="rId3"/>
     <p:sldId id="258" r:id="rId4"/>
+    <p:sldId id="259" r:id="rId5"/>
   </p:sldIdLst>
   <p:sldSz cx="12192000" cy="6858000"/>
   <p:notesSz cx="6858000" cy="9144000"/>
@@ -106,6 +107,11 @@
       </a:defRPr>
     </a:lvl9pPr>
   </p:defaultTextStyle>
+  <p:extLst>
+    <p:ext uri="{EFAFB233-063F-42B5-8137-9DF3F51BA10A}">
+      <p15:sldGuideLst xmlns:p15="http://schemas.microsoft.com/office/powerpoint/2012/main"/>
+    </p:ext>
+  </p:extLst>
 </p:presentation>
 </file>
 
@@ -3496,6 +3502,68 @@
 </p:sld>
 </file>
 
+<file path=ppt/slides/slide4.xml><?xml version="1.0" encoding="utf-8"?>
+<p:sld xmlns:a="http://schemas.openxmlformats.org/drawingml/2006/main" xmlns:r="http://schemas.openxmlformats.org/officeDocument/2006/relationships" xmlns:p="http://schemas.openxmlformats.org/presentationml/2006/main">
+  <p:cSld>
+    <p:bg>
+      <p:bgPr>
+        <a:gradFill flip="none" rotWithShape="1">
+          <a:gsLst>
+            <a:gs pos="0">
+              <a:srgbClr val="8080FF"/>
+            </a:gs>
+            <a:gs pos="10000">
+              <a:srgbClr val="80FF80"/>
+            </a:gs>
+            <a:gs pos="100000">
+              <a:srgbClr val="8080FF"/>
+            </a:gs>
+            <a:gs pos="90000">
+              <a:srgbClr val="800080"/>
+            </a:gs>
+            <a:gs pos="60000">
+              <a:srgbClr val="800080"/>
+            </a:gs>
+            <a:gs pos="40000">
+              <a:srgbClr val="80FF80"/>
+            </a:gs>
+            <a:gs pos="50000">
+              <a:srgbClr val="808000"/>
+            </a:gs>
+          </a:gsLst>
+          <a:lin ang="0" scaled="1"/>
+          <a:tileRect/>
+        </a:gradFill>
+        <a:effectLst/>
+      </p:bgPr>
+    </p:bg>
+    <p:spTree>
+      <p:nvGrpSpPr>
+        <p:cNvPr id="1" name=""/>
+        <p:cNvGrpSpPr/>
+        <p:nvPr/>
+      </p:nvGrpSpPr>
+      <p:grpSpPr>
+        <a:xfrm>
+          <a:off x="0" y="0"/>
+          <a:ext cx="0" cy="0"/>
+          <a:chOff x="0" y="0"/>
+          <a:chExt cx="0" cy="0"/>
+        </a:xfrm>
+      </p:grpSpPr>
+    </p:spTree>
+    <p:extLst>
+      <p:ext uri="{BB962C8B-B14F-4D97-AF65-F5344CB8AC3E}">
+        <p14:creationId xmlns:p14="http://schemas.microsoft.com/office/powerpoint/2010/main" val="1276787118"/>
+      </p:ext>
+    </p:extLst>
+  </p:cSld>
+  <p:clrMapOvr>
+    <a:masterClrMapping/>
+  </p:clrMapOvr>
+</p:sld>
+</file>
+
 <file path=ppt/theme/theme1.xml><?xml version="1.0" encoding="utf-8"?>
 <a:theme xmlns:a="http://schemas.openxmlformats.org/drawingml/2006/main" name="Office-téma">
   <a:themeElements>

</xml_diff>

<commit_message>
sky is better, moon and time set command added
</commit_message>
<xml_diff>
--- a/assets/textures/sky/sky_gradient.pptx
+++ b/assets/textures/sky/sky_gradient.pptx
@@ -262,7 +262,7 @@
           <a:p>
             <a:fld id="{104C2BCD-2B39-4A3D-8999-83A778137C72}" type="datetimeFigureOut">
               <a:rPr lang="hu-HU" smtClean="0"/>
-              <a:t>2024. 03. 11.</a:t>
+              <a:t>2024. 03. 12.</a:t>
             </a:fld>
             <a:endParaRPr lang="hu-HU"/>
           </a:p>
@@ -460,7 +460,7 @@
           <a:p>
             <a:fld id="{104C2BCD-2B39-4A3D-8999-83A778137C72}" type="datetimeFigureOut">
               <a:rPr lang="hu-HU" smtClean="0"/>
-              <a:t>2024. 03. 11.</a:t>
+              <a:t>2024. 03. 12.</a:t>
             </a:fld>
             <a:endParaRPr lang="hu-HU"/>
           </a:p>
@@ -668,7 +668,7 @@
           <a:p>
             <a:fld id="{104C2BCD-2B39-4A3D-8999-83A778137C72}" type="datetimeFigureOut">
               <a:rPr lang="hu-HU" smtClean="0"/>
-              <a:t>2024. 03. 11.</a:t>
+              <a:t>2024. 03. 12.</a:t>
             </a:fld>
             <a:endParaRPr lang="hu-HU"/>
           </a:p>
@@ -866,7 +866,7 @@
           <a:p>
             <a:fld id="{104C2BCD-2B39-4A3D-8999-83A778137C72}" type="datetimeFigureOut">
               <a:rPr lang="hu-HU" smtClean="0"/>
-              <a:t>2024. 03. 11.</a:t>
+              <a:t>2024. 03. 12.</a:t>
             </a:fld>
             <a:endParaRPr lang="hu-HU"/>
           </a:p>
@@ -1141,7 +1141,7 @@
           <a:p>
             <a:fld id="{104C2BCD-2B39-4A3D-8999-83A778137C72}" type="datetimeFigureOut">
               <a:rPr lang="hu-HU" smtClean="0"/>
-              <a:t>2024. 03. 11.</a:t>
+              <a:t>2024. 03. 12.</a:t>
             </a:fld>
             <a:endParaRPr lang="hu-HU"/>
           </a:p>
@@ -1406,7 +1406,7 @@
           <a:p>
             <a:fld id="{104C2BCD-2B39-4A3D-8999-83A778137C72}" type="datetimeFigureOut">
               <a:rPr lang="hu-HU" smtClean="0"/>
-              <a:t>2024. 03. 11.</a:t>
+              <a:t>2024. 03. 12.</a:t>
             </a:fld>
             <a:endParaRPr lang="hu-HU"/>
           </a:p>
@@ -1818,7 +1818,7 @@
           <a:p>
             <a:fld id="{104C2BCD-2B39-4A3D-8999-83A778137C72}" type="datetimeFigureOut">
               <a:rPr lang="hu-HU" smtClean="0"/>
-              <a:t>2024. 03. 11.</a:t>
+              <a:t>2024. 03. 12.</a:t>
             </a:fld>
             <a:endParaRPr lang="hu-HU"/>
           </a:p>
@@ -1959,7 +1959,7 @@
           <a:p>
             <a:fld id="{104C2BCD-2B39-4A3D-8999-83A778137C72}" type="datetimeFigureOut">
               <a:rPr lang="hu-HU" smtClean="0"/>
-              <a:t>2024. 03. 11.</a:t>
+              <a:t>2024. 03. 12.</a:t>
             </a:fld>
             <a:endParaRPr lang="hu-HU"/>
           </a:p>
@@ -2072,7 +2072,7 @@
           <a:p>
             <a:fld id="{104C2BCD-2B39-4A3D-8999-83A778137C72}" type="datetimeFigureOut">
               <a:rPr lang="hu-HU" smtClean="0"/>
-              <a:t>2024. 03. 11.</a:t>
+              <a:t>2024. 03. 12.</a:t>
             </a:fld>
             <a:endParaRPr lang="hu-HU"/>
           </a:p>
@@ -2383,7 +2383,7 @@
           <a:p>
             <a:fld id="{104C2BCD-2B39-4A3D-8999-83A778137C72}" type="datetimeFigureOut">
               <a:rPr lang="hu-HU" smtClean="0"/>
-              <a:t>2024. 03. 11.</a:t>
+              <a:t>2024. 03. 12.</a:t>
             </a:fld>
             <a:endParaRPr lang="hu-HU"/>
           </a:p>
@@ -2671,7 +2671,7 @@
           <a:p>
             <a:fld id="{104C2BCD-2B39-4A3D-8999-83A778137C72}" type="datetimeFigureOut">
               <a:rPr lang="hu-HU" smtClean="0"/>
-              <a:t>2024. 03. 11.</a:t>
+              <a:t>2024. 03. 12.</a:t>
             </a:fld>
             <a:endParaRPr lang="hu-HU"/>
           </a:p>
@@ -2912,7 +2912,7 @@
           <a:p>
             <a:fld id="{104C2BCD-2B39-4A3D-8999-83A778137C72}" type="datetimeFigureOut">
               <a:rPr lang="hu-HU" smtClean="0"/>
-              <a:t>2024. 03. 11.</a:t>
+              <a:t>2024. 03. 12.</a:t>
             </a:fld>
             <a:endParaRPr lang="hu-HU"/>
           </a:p>
@@ -3513,19 +3513,19 @@
               <a:srgbClr val="8080FF"/>
             </a:gs>
             <a:gs pos="10000">
-              <a:srgbClr val="80FF80"/>
+              <a:srgbClr val="808080"/>
             </a:gs>
             <a:gs pos="100000">
               <a:srgbClr val="8080FF"/>
             </a:gs>
             <a:gs pos="90000">
-              <a:srgbClr val="800080"/>
+              <a:srgbClr val="808080"/>
             </a:gs>
             <a:gs pos="60000">
-              <a:srgbClr val="800080"/>
+              <a:srgbClr val="808080"/>
             </a:gs>
             <a:gs pos="40000">
-              <a:srgbClr val="80FF80"/>
+              <a:srgbClr val="808080"/>
             </a:gs>
             <a:gs pos="50000">
               <a:srgbClr val="808000"/>

</xml_diff>

<commit_message>
moon now casts shadows
</commit_message>
<xml_diff>
--- a/assets/textures/sky/sky_gradient.pptx
+++ b/assets/textures/sky/sky_gradient.pptx
@@ -262,7 +262,7 @@
           <a:p>
             <a:fld id="{104C2BCD-2B39-4A3D-8999-83A778137C72}" type="datetimeFigureOut">
               <a:rPr lang="hu-HU" smtClean="0"/>
-              <a:t>2024. 03. 12.</a:t>
+              <a:t>2024. 03. 16.</a:t>
             </a:fld>
             <a:endParaRPr lang="hu-HU"/>
           </a:p>
@@ -460,7 +460,7 @@
           <a:p>
             <a:fld id="{104C2BCD-2B39-4A3D-8999-83A778137C72}" type="datetimeFigureOut">
               <a:rPr lang="hu-HU" smtClean="0"/>
-              <a:t>2024. 03. 12.</a:t>
+              <a:t>2024. 03. 16.</a:t>
             </a:fld>
             <a:endParaRPr lang="hu-HU"/>
           </a:p>
@@ -668,7 +668,7 @@
           <a:p>
             <a:fld id="{104C2BCD-2B39-4A3D-8999-83A778137C72}" type="datetimeFigureOut">
               <a:rPr lang="hu-HU" smtClean="0"/>
-              <a:t>2024. 03. 12.</a:t>
+              <a:t>2024. 03. 16.</a:t>
             </a:fld>
             <a:endParaRPr lang="hu-HU"/>
           </a:p>
@@ -866,7 +866,7 @@
           <a:p>
             <a:fld id="{104C2BCD-2B39-4A3D-8999-83A778137C72}" type="datetimeFigureOut">
               <a:rPr lang="hu-HU" smtClean="0"/>
-              <a:t>2024. 03. 12.</a:t>
+              <a:t>2024. 03. 16.</a:t>
             </a:fld>
             <a:endParaRPr lang="hu-HU"/>
           </a:p>
@@ -1141,7 +1141,7 @@
           <a:p>
             <a:fld id="{104C2BCD-2B39-4A3D-8999-83A778137C72}" type="datetimeFigureOut">
               <a:rPr lang="hu-HU" smtClean="0"/>
-              <a:t>2024. 03. 12.</a:t>
+              <a:t>2024. 03. 16.</a:t>
             </a:fld>
             <a:endParaRPr lang="hu-HU"/>
           </a:p>
@@ -1406,7 +1406,7 @@
           <a:p>
             <a:fld id="{104C2BCD-2B39-4A3D-8999-83A778137C72}" type="datetimeFigureOut">
               <a:rPr lang="hu-HU" smtClean="0"/>
-              <a:t>2024. 03. 12.</a:t>
+              <a:t>2024. 03. 16.</a:t>
             </a:fld>
             <a:endParaRPr lang="hu-HU"/>
           </a:p>
@@ -1818,7 +1818,7 @@
           <a:p>
             <a:fld id="{104C2BCD-2B39-4A3D-8999-83A778137C72}" type="datetimeFigureOut">
               <a:rPr lang="hu-HU" smtClean="0"/>
-              <a:t>2024. 03. 12.</a:t>
+              <a:t>2024. 03. 16.</a:t>
             </a:fld>
             <a:endParaRPr lang="hu-HU"/>
           </a:p>
@@ -1959,7 +1959,7 @@
           <a:p>
             <a:fld id="{104C2BCD-2B39-4A3D-8999-83A778137C72}" type="datetimeFigureOut">
               <a:rPr lang="hu-HU" smtClean="0"/>
-              <a:t>2024. 03. 12.</a:t>
+              <a:t>2024. 03. 16.</a:t>
             </a:fld>
             <a:endParaRPr lang="hu-HU"/>
           </a:p>
@@ -2072,7 +2072,7 @@
           <a:p>
             <a:fld id="{104C2BCD-2B39-4A3D-8999-83A778137C72}" type="datetimeFigureOut">
               <a:rPr lang="hu-HU" smtClean="0"/>
-              <a:t>2024. 03. 12.</a:t>
+              <a:t>2024. 03. 16.</a:t>
             </a:fld>
             <a:endParaRPr lang="hu-HU"/>
           </a:p>
@@ -2383,7 +2383,7 @@
           <a:p>
             <a:fld id="{104C2BCD-2B39-4A3D-8999-83A778137C72}" type="datetimeFigureOut">
               <a:rPr lang="hu-HU" smtClean="0"/>
-              <a:t>2024. 03. 12.</a:t>
+              <a:t>2024. 03. 16.</a:t>
             </a:fld>
             <a:endParaRPr lang="hu-HU"/>
           </a:p>
@@ -2671,7 +2671,7 @@
           <a:p>
             <a:fld id="{104C2BCD-2B39-4A3D-8999-83A778137C72}" type="datetimeFigureOut">
               <a:rPr lang="hu-HU" smtClean="0"/>
-              <a:t>2024. 03. 12.</a:t>
+              <a:t>2024. 03. 16.</a:t>
             </a:fld>
             <a:endParaRPr lang="hu-HU"/>
           </a:p>
@@ -2912,7 +2912,7 @@
           <a:p>
             <a:fld id="{104C2BCD-2B39-4A3D-8999-83A778137C72}" type="datetimeFigureOut">
               <a:rPr lang="hu-HU" smtClean="0"/>
-              <a:t>2024. 03. 12.</a:t>
+              <a:t>2024. 03. 16.</a:t>
             </a:fld>
             <a:endParaRPr lang="hu-HU"/>
           </a:p>
@@ -3512,19 +3512,19 @@
             <a:gs pos="0">
               <a:srgbClr val="8080FF"/>
             </a:gs>
-            <a:gs pos="10000">
+            <a:gs pos="20000">
               <a:srgbClr val="808080"/>
             </a:gs>
             <a:gs pos="100000">
               <a:srgbClr val="8080FF"/>
             </a:gs>
-            <a:gs pos="90000">
+            <a:gs pos="80000">
               <a:srgbClr val="808080"/>
             </a:gs>
-            <a:gs pos="60000">
+            <a:gs pos="70000">
               <a:srgbClr val="808080"/>
             </a:gs>
-            <a:gs pos="40000">
+            <a:gs pos="30000">
               <a:srgbClr val="808080"/>
             </a:gs>
             <a:gs pos="50000">

</xml_diff>